<commit_message>
slide on CSS Selectors
</commit_message>
<xml_diff>
--- a/docs/slides/lesson_04.pptx
+++ b/docs/slides/lesson_04.pptx
@@ -5,7 +5,7 @@
     <p:sldMasterId id="2147483648" r:id="rId1"/>
   </p:sldMasterIdLst>
   <p:notesMasterIdLst>
-    <p:notesMasterId r:id="rId11"/>
+    <p:notesMasterId r:id="rId12"/>
   </p:notesMasterIdLst>
   <p:sldIdLst>
     <p:sldId id="256" r:id="rId2"/>
@@ -17,6 +17,7 @@
     <p:sldId id="262" r:id="rId8"/>
     <p:sldId id="263" r:id="rId9"/>
     <p:sldId id="264" r:id="rId10"/>
+    <p:sldId id="265" r:id="rId11"/>
   </p:sldIdLst>
   <p:sldSz cx="12192000" cy="6858000"/>
   <p:notesSz cx="6858000" cy="9144000"/>
@@ -129,6 +130,7 @@
             <p14:sldId id="262"/>
             <p14:sldId id="263"/>
             <p14:sldId id="264"/>
+            <p14:sldId id="265"/>
           </p14:sldIdLst>
         </p14:section>
       </p14:sectionLst>
@@ -222,7 +224,7 @@
           <a:p>
             <a:fld id="{9B5B52BA-3295-0343-9E28-A260A811DD10}" type="datetimeFigureOut">
               <a:rPr lang="en-US" smtClean="0"/>
-              <a:t>12-Dec-19</a:t>
+              <a:t>1/2/2021</a:t>
             </a:fld>
             <a:endParaRPr lang="en-US"/>
           </a:p>
@@ -286,38 +288,37 @@
           <a:p>
             <a:pPr lvl="0"/>
             <a:r>
-              <a:rPr lang="en-US" smtClean="0"/>
+              <a:rPr lang="en-US"/>
               <a:t>Click to edit Master text styles</a:t>
             </a:r>
           </a:p>
           <a:p>
             <a:pPr lvl="1"/>
             <a:r>
-              <a:rPr lang="en-US" smtClean="0"/>
+              <a:rPr lang="en-US"/>
               <a:t>Second level</a:t>
             </a:r>
           </a:p>
           <a:p>
             <a:pPr lvl="2"/>
             <a:r>
-              <a:rPr lang="en-US" smtClean="0"/>
+              <a:rPr lang="en-US"/>
               <a:t>Third level</a:t>
             </a:r>
           </a:p>
           <a:p>
             <a:pPr lvl="3"/>
             <a:r>
-              <a:rPr lang="en-US" smtClean="0"/>
+              <a:rPr lang="en-US"/>
               <a:t>Fourth level</a:t>
             </a:r>
           </a:p>
           <a:p>
             <a:pPr lvl="4"/>
             <a:r>
-              <a:rPr lang="en-US" smtClean="0"/>
+              <a:rPr lang="en-US"/>
               <a:t>Fifth level</a:t>
             </a:r>
-            <a:endParaRPr lang="en-US"/>
           </a:p>
         </p:txBody>
       </p:sp>
@@ -616,10 +617,9 @@
           </a:lstStyle>
           <a:p>
             <a:r>
-              <a:rPr lang="en-US" dirty="0" smtClean="0"/>
+              <a:rPr lang="en-US" dirty="0"/>
               <a:t>Click to edit Master title style</a:t>
             </a:r>
-            <a:endParaRPr lang="en-US" dirty="0"/>
           </a:p>
         </p:txBody>
       </p:sp>
@@ -681,10 +681,9 @@
           </a:lstStyle>
           <a:p>
             <a:r>
-              <a:rPr lang="en-US" dirty="0" smtClean="0"/>
+              <a:rPr lang="en-US" dirty="0"/>
               <a:t>Click to edit Master subtitle style</a:t>
             </a:r>
-            <a:endParaRPr lang="en-US" dirty="0"/>
           </a:p>
         </p:txBody>
       </p:sp>
@@ -705,7 +704,7 @@
           <a:p>
             <a:fld id="{04F1D4A2-813C-F741-B481-C92B3A596030}" type="datetimeFigureOut">
               <a:rPr lang="en-US" smtClean="0"/>
-              <a:t>12-Dec-19</a:t>
+              <a:t>1/2/2021</a:t>
             </a:fld>
             <a:endParaRPr lang="en-US"/>
           </a:p>
@@ -799,10 +798,9 @@
           <a:lstStyle/>
           <a:p>
             <a:r>
-              <a:rPr lang="en-US" smtClean="0"/>
+              <a:rPr lang="en-US"/>
               <a:t>Click to edit Master title style</a:t>
             </a:r>
-            <a:endParaRPr lang="en-US"/>
           </a:p>
         </p:txBody>
       </p:sp>
@@ -823,38 +821,37 @@
           <a:p>
             <a:pPr lvl="0"/>
             <a:r>
-              <a:rPr lang="en-US" smtClean="0"/>
+              <a:rPr lang="en-US"/>
               <a:t>Click to edit Master text styles</a:t>
             </a:r>
           </a:p>
           <a:p>
             <a:pPr lvl="1"/>
             <a:r>
-              <a:rPr lang="en-US" smtClean="0"/>
+              <a:rPr lang="en-US"/>
               <a:t>Second level</a:t>
             </a:r>
           </a:p>
           <a:p>
             <a:pPr lvl="2"/>
             <a:r>
-              <a:rPr lang="en-US" smtClean="0"/>
+              <a:rPr lang="en-US"/>
               <a:t>Third level</a:t>
             </a:r>
           </a:p>
           <a:p>
             <a:pPr lvl="3"/>
             <a:r>
-              <a:rPr lang="en-US" smtClean="0"/>
+              <a:rPr lang="en-US"/>
               <a:t>Fourth level</a:t>
             </a:r>
           </a:p>
           <a:p>
             <a:pPr lvl="4"/>
             <a:r>
-              <a:rPr lang="en-US" smtClean="0"/>
+              <a:rPr lang="en-US"/>
               <a:t>Fifth level</a:t>
             </a:r>
-            <a:endParaRPr lang="en-US"/>
           </a:p>
         </p:txBody>
       </p:sp>
@@ -875,7 +872,7 @@
           <a:p>
             <a:fld id="{04F1D4A2-813C-F741-B481-C92B3A596030}" type="datetimeFigureOut">
               <a:rPr lang="en-US" smtClean="0"/>
-              <a:t>12-Dec-19</a:t>
+              <a:t>1/2/2021</a:t>
             </a:fld>
             <a:endParaRPr lang="en-US"/>
           </a:p>
@@ -974,10 +971,9 @@
           <a:lstStyle/>
           <a:p>
             <a:r>
-              <a:rPr lang="en-US" smtClean="0"/>
+              <a:rPr lang="en-US"/>
               <a:t>Click to edit Master title style</a:t>
             </a:r>
-            <a:endParaRPr lang="en-US"/>
           </a:p>
         </p:txBody>
       </p:sp>
@@ -1003,38 +999,37 @@
           <a:p>
             <a:pPr lvl="0"/>
             <a:r>
-              <a:rPr lang="en-US" smtClean="0"/>
+              <a:rPr lang="en-US"/>
               <a:t>Click to edit Master text styles</a:t>
             </a:r>
           </a:p>
           <a:p>
             <a:pPr lvl="1"/>
             <a:r>
-              <a:rPr lang="en-US" smtClean="0"/>
+              <a:rPr lang="en-US"/>
               <a:t>Second level</a:t>
             </a:r>
           </a:p>
           <a:p>
             <a:pPr lvl="2"/>
             <a:r>
-              <a:rPr lang="en-US" smtClean="0"/>
+              <a:rPr lang="en-US"/>
               <a:t>Third level</a:t>
             </a:r>
           </a:p>
           <a:p>
             <a:pPr lvl="3"/>
             <a:r>
-              <a:rPr lang="en-US" smtClean="0"/>
+              <a:rPr lang="en-US"/>
               <a:t>Fourth level</a:t>
             </a:r>
           </a:p>
           <a:p>
             <a:pPr lvl="4"/>
             <a:r>
-              <a:rPr lang="en-US" smtClean="0"/>
+              <a:rPr lang="en-US"/>
               <a:t>Fifth level</a:t>
             </a:r>
-            <a:endParaRPr lang="en-US"/>
           </a:p>
         </p:txBody>
       </p:sp>
@@ -1055,7 +1050,7 @@
           <a:p>
             <a:fld id="{04F1D4A2-813C-F741-B481-C92B3A596030}" type="datetimeFigureOut">
               <a:rPr lang="en-US" smtClean="0"/>
-              <a:t>12-Dec-19</a:t>
+              <a:t>1/2/2021</a:t>
             </a:fld>
             <a:endParaRPr lang="en-US"/>
           </a:p>
@@ -1153,10 +1148,9 @@
           </a:lstStyle>
           <a:p>
             <a:r>
-              <a:rPr lang="en-US" dirty="0" smtClean="0"/>
+              <a:rPr lang="en-US" dirty="0"/>
               <a:t>Click to edit Master title style</a:t>
             </a:r>
-            <a:endParaRPr lang="en-US" dirty="0"/>
           </a:p>
         </p:txBody>
       </p:sp>
@@ -1184,38 +1178,37 @@
           <a:p>
             <a:pPr lvl="0"/>
             <a:r>
-              <a:rPr lang="en-US" dirty="0" smtClean="0"/>
+              <a:rPr lang="en-US" dirty="0"/>
               <a:t>Click to edit Master text styles</a:t>
             </a:r>
           </a:p>
           <a:p>
             <a:pPr lvl="1"/>
             <a:r>
-              <a:rPr lang="en-US" dirty="0" smtClean="0"/>
+              <a:rPr lang="en-US" dirty="0"/>
               <a:t>Second level</a:t>
             </a:r>
           </a:p>
           <a:p>
             <a:pPr lvl="2"/>
             <a:r>
-              <a:rPr lang="en-US" dirty="0" smtClean="0"/>
+              <a:rPr lang="en-US" dirty="0"/>
               <a:t>Third level</a:t>
             </a:r>
           </a:p>
           <a:p>
             <a:pPr lvl="3"/>
             <a:r>
-              <a:rPr lang="en-US" dirty="0" smtClean="0"/>
+              <a:rPr lang="en-US" dirty="0"/>
               <a:t>Fourth level</a:t>
             </a:r>
           </a:p>
           <a:p>
             <a:pPr lvl="4"/>
             <a:r>
-              <a:rPr lang="en-US" dirty="0" smtClean="0"/>
+              <a:rPr lang="en-US" dirty="0"/>
               <a:t>Fifth level</a:t>
             </a:r>
-            <a:endParaRPr lang="en-US" dirty="0"/>
           </a:p>
         </p:txBody>
       </p:sp>
@@ -1236,7 +1229,7 @@
           <a:p>
             <a:fld id="{04F1D4A2-813C-F741-B481-C92B3A596030}" type="datetimeFigureOut">
               <a:rPr lang="en-US" smtClean="0"/>
-              <a:t>12-Dec-19</a:t>
+              <a:t>1/2/2021</a:t>
             </a:fld>
             <a:endParaRPr lang="en-US"/>
           </a:p>
@@ -1339,10 +1332,9 @@
           </a:lstStyle>
           <a:p>
             <a:r>
-              <a:rPr lang="en-US" smtClean="0"/>
+              <a:rPr lang="en-US"/>
               <a:t>Click to edit Master title style</a:t>
             </a:r>
-            <a:endParaRPr lang="en-US"/>
           </a:p>
         </p:txBody>
       </p:sp>
@@ -1459,7 +1451,7 @@
           <a:p>
             <a:pPr lvl="0"/>
             <a:r>
-              <a:rPr lang="en-US" smtClean="0"/>
+              <a:rPr lang="en-US"/>
               <a:t>Click to edit Master text styles</a:t>
             </a:r>
           </a:p>
@@ -1482,7 +1474,7 @@
           <a:p>
             <a:fld id="{04F1D4A2-813C-F741-B481-C92B3A596030}" type="datetimeFigureOut">
               <a:rPr lang="en-US" smtClean="0"/>
-              <a:t>12-Dec-19</a:t>
+              <a:t>1/2/2021</a:t>
             </a:fld>
             <a:endParaRPr lang="en-US"/>
           </a:p>
@@ -1576,10 +1568,9 @@
           <a:lstStyle/>
           <a:p>
             <a:r>
-              <a:rPr lang="en-US" smtClean="0"/>
+              <a:rPr lang="en-US"/>
               <a:t>Click to edit Master title style</a:t>
             </a:r>
-            <a:endParaRPr lang="en-US"/>
           </a:p>
         </p:txBody>
       </p:sp>
@@ -1605,38 +1596,37 @@
           <a:p>
             <a:pPr lvl="0"/>
             <a:r>
-              <a:rPr lang="en-US" smtClean="0"/>
+              <a:rPr lang="en-US"/>
               <a:t>Click to edit Master text styles</a:t>
             </a:r>
           </a:p>
           <a:p>
             <a:pPr lvl="1"/>
             <a:r>
-              <a:rPr lang="en-US" smtClean="0"/>
+              <a:rPr lang="en-US"/>
               <a:t>Second level</a:t>
             </a:r>
           </a:p>
           <a:p>
             <a:pPr lvl="2"/>
             <a:r>
-              <a:rPr lang="en-US" smtClean="0"/>
+              <a:rPr lang="en-US"/>
               <a:t>Third level</a:t>
             </a:r>
           </a:p>
           <a:p>
             <a:pPr lvl="3"/>
             <a:r>
-              <a:rPr lang="en-US" smtClean="0"/>
+              <a:rPr lang="en-US"/>
               <a:t>Fourth level</a:t>
             </a:r>
           </a:p>
           <a:p>
             <a:pPr lvl="4"/>
             <a:r>
-              <a:rPr lang="en-US" smtClean="0"/>
+              <a:rPr lang="en-US"/>
               <a:t>Fifth level</a:t>
             </a:r>
-            <a:endParaRPr lang="en-US"/>
           </a:p>
         </p:txBody>
       </p:sp>
@@ -1662,38 +1652,37 @@
           <a:p>
             <a:pPr lvl="0"/>
             <a:r>
-              <a:rPr lang="en-US" smtClean="0"/>
+              <a:rPr lang="en-US"/>
               <a:t>Click to edit Master text styles</a:t>
             </a:r>
           </a:p>
           <a:p>
             <a:pPr lvl="1"/>
             <a:r>
-              <a:rPr lang="en-US" smtClean="0"/>
+              <a:rPr lang="en-US"/>
               <a:t>Second level</a:t>
             </a:r>
           </a:p>
           <a:p>
             <a:pPr lvl="2"/>
             <a:r>
-              <a:rPr lang="en-US" smtClean="0"/>
+              <a:rPr lang="en-US"/>
               <a:t>Third level</a:t>
             </a:r>
           </a:p>
           <a:p>
             <a:pPr lvl="3"/>
             <a:r>
-              <a:rPr lang="en-US" smtClean="0"/>
+              <a:rPr lang="en-US"/>
               <a:t>Fourth level</a:t>
             </a:r>
           </a:p>
           <a:p>
             <a:pPr lvl="4"/>
             <a:r>
-              <a:rPr lang="en-US" smtClean="0"/>
+              <a:rPr lang="en-US"/>
               <a:t>Fifth level</a:t>
             </a:r>
-            <a:endParaRPr lang="en-US"/>
           </a:p>
         </p:txBody>
       </p:sp>
@@ -1714,7 +1703,7 @@
           <a:p>
             <a:fld id="{04F1D4A2-813C-F741-B481-C92B3A596030}" type="datetimeFigureOut">
               <a:rPr lang="en-US" smtClean="0"/>
-              <a:t>12-Dec-19</a:t>
+              <a:t>1/2/2021</a:t>
             </a:fld>
             <a:endParaRPr lang="en-US"/>
           </a:p>
@@ -1813,10 +1802,9 @@
           <a:lstStyle/>
           <a:p>
             <a:r>
-              <a:rPr lang="en-US" smtClean="0"/>
+              <a:rPr lang="en-US"/>
               <a:t>Click to edit Master title style</a:t>
             </a:r>
-            <a:endParaRPr lang="en-US"/>
           </a:p>
         </p:txBody>
       </p:sp>
@@ -1879,7 +1867,7 @@
           <a:p>
             <a:pPr lvl="0"/>
             <a:r>
-              <a:rPr lang="en-US" smtClean="0"/>
+              <a:rPr lang="en-US"/>
               <a:t>Click to edit Master text styles</a:t>
             </a:r>
           </a:p>
@@ -1907,38 +1895,37 @@
           <a:p>
             <a:pPr lvl="0"/>
             <a:r>
-              <a:rPr lang="en-US" smtClean="0"/>
+              <a:rPr lang="en-US"/>
               <a:t>Click to edit Master text styles</a:t>
             </a:r>
           </a:p>
           <a:p>
             <a:pPr lvl="1"/>
             <a:r>
-              <a:rPr lang="en-US" smtClean="0"/>
+              <a:rPr lang="en-US"/>
               <a:t>Second level</a:t>
             </a:r>
           </a:p>
           <a:p>
             <a:pPr lvl="2"/>
             <a:r>
-              <a:rPr lang="en-US" smtClean="0"/>
+              <a:rPr lang="en-US"/>
               <a:t>Third level</a:t>
             </a:r>
           </a:p>
           <a:p>
             <a:pPr lvl="3"/>
             <a:r>
-              <a:rPr lang="en-US" smtClean="0"/>
+              <a:rPr lang="en-US"/>
               <a:t>Fourth level</a:t>
             </a:r>
           </a:p>
           <a:p>
             <a:pPr lvl="4"/>
             <a:r>
-              <a:rPr lang="en-US" smtClean="0"/>
+              <a:rPr lang="en-US"/>
               <a:t>Fifth level</a:t>
             </a:r>
-            <a:endParaRPr lang="en-US"/>
           </a:p>
         </p:txBody>
       </p:sp>
@@ -2001,7 +1988,7 @@
           <a:p>
             <a:pPr lvl="0"/>
             <a:r>
-              <a:rPr lang="en-US" smtClean="0"/>
+              <a:rPr lang="en-US"/>
               <a:t>Click to edit Master text styles</a:t>
             </a:r>
           </a:p>
@@ -2029,38 +2016,37 @@
           <a:p>
             <a:pPr lvl="0"/>
             <a:r>
-              <a:rPr lang="en-US" smtClean="0"/>
+              <a:rPr lang="en-US"/>
               <a:t>Click to edit Master text styles</a:t>
             </a:r>
           </a:p>
           <a:p>
             <a:pPr lvl="1"/>
             <a:r>
-              <a:rPr lang="en-US" smtClean="0"/>
+              <a:rPr lang="en-US"/>
               <a:t>Second level</a:t>
             </a:r>
           </a:p>
           <a:p>
             <a:pPr lvl="2"/>
             <a:r>
-              <a:rPr lang="en-US" smtClean="0"/>
+              <a:rPr lang="en-US"/>
               <a:t>Third level</a:t>
             </a:r>
           </a:p>
           <a:p>
             <a:pPr lvl="3"/>
             <a:r>
-              <a:rPr lang="en-US" smtClean="0"/>
+              <a:rPr lang="en-US"/>
               <a:t>Fourth level</a:t>
             </a:r>
           </a:p>
           <a:p>
             <a:pPr lvl="4"/>
             <a:r>
-              <a:rPr lang="en-US" smtClean="0"/>
+              <a:rPr lang="en-US"/>
               <a:t>Fifth level</a:t>
             </a:r>
-            <a:endParaRPr lang="en-US"/>
           </a:p>
         </p:txBody>
       </p:sp>
@@ -2081,7 +2067,7 @@
           <a:p>
             <a:fld id="{04F1D4A2-813C-F741-B481-C92B3A596030}" type="datetimeFigureOut">
               <a:rPr lang="en-US" smtClean="0"/>
-              <a:t>12-Dec-19</a:t>
+              <a:t>1/2/2021</a:t>
             </a:fld>
             <a:endParaRPr lang="en-US"/>
           </a:p>
@@ -2175,10 +2161,9 @@
           <a:lstStyle/>
           <a:p>
             <a:r>
-              <a:rPr lang="en-US" smtClean="0"/>
+              <a:rPr lang="en-US"/>
               <a:t>Click to edit Master title style</a:t>
             </a:r>
-            <a:endParaRPr lang="en-US"/>
           </a:p>
         </p:txBody>
       </p:sp>
@@ -2199,7 +2184,7 @@
           <a:p>
             <a:fld id="{04F1D4A2-813C-F741-B481-C92B3A596030}" type="datetimeFigureOut">
               <a:rPr lang="en-US" smtClean="0"/>
-              <a:t>12-Dec-19</a:t>
+              <a:t>1/2/2021</a:t>
             </a:fld>
             <a:endParaRPr lang="en-US"/>
           </a:p>
@@ -2294,7 +2279,7 @@
           <a:p>
             <a:fld id="{04F1D4A2-813C-F741-B481-C92B3A596030}" type="datetimeFigureOut">
               <a:rPr lang="en-US" smtClean="0"/>
-              <a:t>12-Dec-19</a:t>
+              <a:t>1/2/2021</a:t>
             </a:fld>
             <a:endParaRPr lang="en-US"/>
           </a:p>
@@ -2397,10 +2382,9 @@
           </a:lstStyle>
           <a:p>
             <a:r>
-              <a:rPr lang="en-US" smtClean="0"/>
+              <a:rPr lang="en-US"/>
               <a:t>Click to edit Master title style</a:t>
             </a:r>
-            <a:endParaRPr lang="en-US"/>
           </a:p>
         </p:txBody>
       </p:sp>
@@ -2454,38 +2438,37 @@
           <a:p>
             <a:pPr lvl="0"/>
             <a:r>
-              <a:rPr lang="en-US" smtClean="0"/>
+              <a:rPr lang="en-US"/>
               <a:t>Click to edit Master text styles</a:t>
             </a:r>
           </a:p>
           <a:p>
             <a:pPr lvl="1"/>
             <a:r>
-              <a:rPr lang="en-US" smtClean="0"/>
+              <a:rPr lang="en-US"/>
               <a:t>Second level</a:t>
             </a:r>
           </a:p>
           <a:p>
             <a:pPr lvl="2"/>
             <a:r>
-              <a:rPr lang="en-US" smtClean="0"/>
+              <a:rPr lang="en-US"/>
               <a:t>Third level</a:t>
             </a:r>
           </a:p>
           <a:p>
             <a:pPr lvl="3"/>
             <a:r>
-              <a:rPr lang="en-US" smtClean="0"/>
+              <a:rPr lang="en-US"/>
               <a:t>Fourth level</a:t>
             </a:r>
           </a:p>
           <a:p>
             <a:pPr lvl="4"/>
             <a:r>
-              <a:rPr lang="en-US" smtClean="0"/>
+              <a:rPr lang="en-US"/>
               <a:t>Fifth level</a:t>
             </a:r>
-            <a:endParaRPr lang="en-US"/>
           </a:p>
         </p:txBody>
       </p:sp>
@@ -2548,7 +2531,7 @@
           <a:p>
             <a:pPr lvl="0"/>
             <a:r>
-              <a:rPr lang="en-US" smtClean="0"/>
+              <a:rPr lang="en-US"/>
               <a:t>Click to edit Master text styles</a:t>
             </a:r>
           </a:p>
@@ -2571,7 +2554,7 @@
           <a:p>
             <a:fld id="{04F1D4A2-813C-F741-B481-C92B3A596030}" type="datetimeFigureOut">
               <a:rPr lang="en-US" smtClean="0"/>
-              <a:t>12-Dec-19</a:t>
+              <a:t>1/2/2021</a:t>
             </a:fld>
             <a:endParaRPr lang="en-US"/>
           </a:p>
@@ -2674,10 +2657,9 @@
           </a:lstStyle>
           <a:p>
             <a:r>
-              <a:rPr lang="en-US" smtClean="0"/>
+              <a:rPr lang="en-US"/>
               <a:t>Click to edit Master title style</a:t>
             </a:r>
-            <a:endParaRPr lang="en-US"/>
           </a:p>
         </p:txBody>
       </p:sp>
@@ -2801,7 +2783,7 @@
           <a:p>
             <a:pPr lvl="0"/>
             <a:r>
-              <a:rPr lang="en-US" smtClean="0"/>
+              <a:rPr lang="en-US"/>
               <a:t>Click to edit Master text styles</a:t>
             </a:r>
           </a:p>
@@ -2824,7 +2806,7 @@
           <a:p>
             <a:fld id="{04F1D4A2-813C-F741-B481-C92B3A596030}" type="datetimeFigureOut">
               <a:rPr lang="en-US" smtClean="0"/>
-              <a:t>12-Dec-19</a:t>
+              <a:t>1/2/2021</a:t>
             </a:fld>
             <a:endParaRPr lang="en-US"/>
           </a:p>
@@ -2933,10 +2915,9 @@
           <a:lstStyle/>
           <a:p>
             <a:r>
-              <a:rPr lang="en-US" dirty="0" smtClean="0"/>
+              <a:rPr lang="en-US" dirty="0"/>
               <a:t>Click to edit Master title style</a:t>
             </a:r>
-            <a:endParaRPr lang="en-US" dirty="0"/>
           </a:p>
         </p:txBody>
       </p:sp>
@@ -2967,38 +2948,37 @@
           <a:p>
             <a:pPr lvl="0"/>
             <a:r>
-              <a:rPr lang="en-US" smtClean="0"/>
+              <a:rPr lang="en-US"/>
               <a:t>Click to edit Master text styles</a:t>
             </a:r>
           </a:p>
           <a:p>
             <a:pPr lvl="1"/>
             <a:r>
-              <a:rPr lang="en-US" smtClean="0"/>
+              <a:rPr lang="en-US"/>
               <a:t>Second level</a:t>
             </a:r>
           </a:p>
           <a:p>
             <a:pPr lvl="2"/>
             <a:r>
-              <a:rPr lang="en-US" smtClean="0"/>
+              <a:rPr lang="en-US"/>
               <a:t>Third level</a:t>
             </a:r>
           </a:p>
           <a:p>
             <a:pPr lvl="3"/>
             <a:r>
-              <a:rPr lang="en-US" smtClean="0"/>
+              <a:rPr lang="en-US"/>
               <a:t>Fourth level</a:t>
             </a:r>
           </a:p>
           <a:p>
             <a:pPr lvl="4"/>
             <a:r>
-              <a:rPr lang="en-US" smtClean="0"/>
+              <a:rPr lang="en-US"/>
               <a:t>Fifth level</a:t>
             </a:r>
-            <a:endParaRPr lang="en-US"/>
           </a:p>
         </p:txBody>
       </p:sp>
@@ -3037,7 +3017,7 @@
           <a:p>
             <a:fld id="{04F1D4A2-813C-F741-B481-C92B3A596030}" type="datetimeFigureOut">
               <a:rPr lang="en-US" smtClean="0"/>
-              <a:t>12-Dec-19</a:t>
+              <a:t>1/2/2021</a:t>
             </a:fld>
             <a:endParaRPr lang="en-US"/>
           </a:p>
@@ -3466,26 +3446,18 @@
           <a:p>
             <a:pPr algn="l"/>
             <a:r>
-              <a:rPr lang="en-US" sz="6600" dirty="0" smtClean="0"/>
+              <a:rPr lang="en-US" sz="6600" dirty="0"/>
               <a:t>Web Development and API Design</a:t>
             </a:r>
             <a:br>
-              <a:rPr lang="en-US" sz="6600" dirty="0" smtClean="0"/>
+              <a:rPr lang="en-US" sz="6600" dirty="0"/>
             </a:br>
-            <a:r>
-              <a:rPr lang="en-US" sz="6600" dirty="0" smtClean="0"/>
-              <a:t/>
-            </a:r>
             <a:br>
-              <a:rPr lang="en-US" sz="6600" dirty="0" smtClean="0"/>
+              <a:rPr lang="en-US" sz="6600" dirty="0"/>
             </a:br>
             <a:r>
-              <a:rPr lang="en-US" sz="6600" dirty="0" smtClean="0"/>
-              <a:t>Lesson 04</a:t>
-            </a:r>
-            <a:r>
               <a:rPr lang="en-US" sz="6600" dirty="0"/>
-              <a:t>: SPA State Handling</a:t>
+              <a:t>Lesson 04: SPA State Handling</a:t>
             </a:r>
           </a:p>
         </p:txBody>
@@ -3515,17 +3487,13 @@
             <a:pPr algn="r"/>
             <a:r>
               <a:rPr lang="en-US" dirty="0"/>
-              <a:t>P</a:t>
-            </a:r>
-            <a:r>
-              <a:rPr lang="en-US" dirty="0" smtClean="0"/>
-              <a:t>rof. Andrea </a:t>
-            </a:r>
-            <a:r>
-              <a:rPr lang="en-US" dirty="0" err="1" smtClean="0"/>
+              <a:t>Prof. Andrea </a:t>
+            </a:r>
+            <a:r>
+              <a:rPr lang="en-US" dirty="0" err="1"/>
               <a:t>Arcuri</a:t>
             </a:r>
-            <a:endParaRPr lang="en-US" dirty="0" smtClean="0"/>
+            <a:endParaRPr lang="en-US" dirty="0"/>
           </a:p>
         </p:txBody>
       </p:sp>
@@ -3533,6 +3501,201 @@
     <p:extLst>
       <p:ext uri="{BB962C8B-B14F-4D97-AF65-F5344CB8AC3E}">
         <p14:creationId xmlns:p14="http://schemas.microsoft.com/office/powerpoint/2010/main" val="1659239731"/>
+      </p:ext>
+    </p:extLst>
+  </p:cSld>
+  <p:clrMapOvr>
+    <a:masterClrMapping/>
+  </p:clrMapOvr>
+</p:sld>
+</file>
+
+<file path=ppt/slides/slide10.xml><?xml version="1.0" encoding="utf-8"?>
+<p:sld xmlns:a="http://schemas.openxmlformats.org/drawingml/2006/main" xmlns:r="http://schemas.openxmlformats.org/officeDocument/2006/relationships" xmlns:p="http://schemas.openxmlformats.org/presentationml/2006/main">
+  <p:cSld>
+    <p:spTree>
+      <p:nvGrpSpPr>
+        <p:cNvPr id="1" name=""/>
+        <p:cNvGrpSpPr/>
+        <p:nvPr/>
+      </p:nvGrpSpPr>
+      <p:grpSpPr>
+        <a:xfrm>
+          <a:off x="0" y="0"/>
+          <a:ext cx="0" cy="0"/>
+          <a:chOff x="0" y="0"/>
+          <a:chExt cx="0" cy="0"/>
+        </a:xfrm>
+      </p:grpSpPr>
+      <p:sp>
+        <p:nvSpPr>
+          <p:cNvPr id="2" name="Title 1">
+            <a:extLst>
+              <a:ext uri="{FF2B5EF4-FFF2-40B4-BE49-F238E27FC236}">
+                <a16:creationId xmlns:a16="http://schemas.microsoft.com/office/drawing/2014/main" id="{F8AFBAF7-1CBB-4FC9-977C-E32EEAD1EE22}"/>
+              </a:ext>
+            </a:extLst>
+          </p:cNvPr>
+          <p:cNvSpPr>
+            <a:spLocks noGrp="1"/>
+          </p:cNvSpPr>
+          <p:nvPr>
+            <p:ph type="title"/>
+          </p:nvPr>
+        </p:nvSpPr>
+        <p:spPr/>
+        <p:txBody>
+          <a:bodyPr/>
+          <a:lstStyle/>
+          <a:p>
+            <a:r>
+              <a:rPr lang="en-US" dirty="0"/>
+              <a:t>CSS Selectors</a:t>
+            </a:r>
+          </a:p>
+        </p:txBody>
+      </p:sp>
+      <p:sp>
+        <p:nvSpPr>
+          <p:cNvPr id="3" name="Content Placeholder 2">
+            <a:extLst>
+              <a:ext uri="{FF2B5EF4-FFF2-40B4-BE49-F238E27FC236}">
+                <a16:creationId xmlns:a16="http://schemas.microsoft.com/office/drawing/2014/main" id="{5E696D91-2E7C-4324-A487-E721467CEAFE}"/>
+              </a:ext>
+            </a:extLst>
+          </p:cNvPr>
+          <p:cNvSpPr>
+            <a:spLocks noGrp="1"/>
+          </p:cNvSpPr>
+          <p:nvPr>
+            <p:ph idx="1"/>
+          </p:nvPr>
+        </p:nvSpPr>
+        <p:spPr>
+          <a:xfrm>
+            <a:off x="282741" y="1825625"/>
+            <a:ext cx="11694695" cy="4845886"/>
+          </a:xfrm>
+        </p:spPr>
+        <p:txBody>
+          <a:bodyPr/>
+          <a:lstStyle/>
+          <a:p>
+            <a:r>
+              <a:rPr lang="en-US" dirty="0"/>
+              <a:t>When we need to interact with a web page with </a:t>
+            </a:r>
+            <a:r>
+              <a:rPr lang="en-US" i="1" dirty="0"/>
+              <a:t>Enzyme</a:t>
+            </a:r>
+            <a:r>
+              <a:rPr lang="en-US" dirty="0"/>
+              <a:t>, need to specify the HTML elements </a:t>
+            </a:r>
+          </a:p>
+          <a:p>
+            <a:pPr lvl="1"/>
+            <a:r>
+              <a:rPr lang="en-US" dirty="0" err="1"/>
+              <a:t>eg</a:t>
+            </a:r>
+            <a:r>
+              <a:rPr lang="en-US" dirty="0"/>
+              <a:t>, which button to click, and which text area to fill</a:t>
+            </a:r>
+          </a:p>
+          <a:p>
+            <a:r>
+              <a:rPr lang="en-US" dirty="0"/>
+              <a:t>2 main languages to select elements in HTML: </a:t>
+            </a:r>
+            <a:r>
+              <a:rPr lang="en-US" i="1" dirty="0"/>
+              <a:t>CSS Selectors </a:t>
+            </a:r>
+            <a:r>
+              <a:rPr lang="en-US" dirty="0"/>
+              <a:t>and </a:t>
+            </a:r>
+            <a:r>
+              <a:rPr lang="en-US" i="1" dirty="0"/>
+              <a:t>XPath</a:t>
+            </a:r>
+          </a:p>
+          <a:p>
+            <a:r>
+              <a:rPr lang="en-US" i="1" dirty="0"/>
+              <a:t>CSS Selectors</a:t>
+            </a:r>
+            <a:r>
+              <a:rPr lang="en-US" dirty="0"/>
+              <a:t> are the same as when writing </a:t>
+            </a:r>
+            <a:r>
+              <a:rPr lang="en-US" i="1" dirty="0"/>
+              <a:t>.</a:t>
+            </a:r>
+            <a:r>
+              <a:rPr lang="en-US" i="1" dirty="0" err="1"/>
+              <a:t>css</a:t>
+            </a:r>
+            <a:r>
+              <a:rPr lang="en-US" dirty="0"/>
+              <a:t> files</a:t>
+            </a:r>
+          </a:p>
+          <a:p>
+            <a:pPr lvl="1"/>
+            <a:r>
+              <a:rPr lang="en-US" i="1" dirty="0"/>
+              <a:t>“.foo”</a:t>
+            </a:r>
+            <a:r>
+              <a:rPr lang="en-US" dirty="0"/>
+              <a:t>: select all HTML elements with </a:t>
+            </a:r>
+            <a:r>
+              <a:rPr lang="en-US" i="1" dirty="0"/>
+              <a:t>class</a:t>
+            </a:r>
+            <a:r>
+              <a:rPr lang="en-US" dirty="0"/>
+              <a:t> attribute “foo”</a:t>
+            </a:r>
+          </a:p>
+          <a:p>
+            <a:pPr lvl="1"/>
+            <a:r>
+              <a:rPr lang="en-US" i="1" dirty="0"/>
+              <a:t>“#foo”</a:t>
+            </a:r>
+            <a:r>
+              <a:rPr lang="en-US" dirty="0"/>
+              <a:t>: select element with </a:t>
+            </a:r>
+            <a:r>
+              <a:rPr lang="en-US" i="1" dirty="0"/>
+              <a:t>id</a:t>
+            </a:r>
+            <a:r>
+              <a:rPr lang="en-US" dirty="0"/>
+              <a:t> attribute “foo” </a:t>
+            </a:r>
+          </a:p>
+          <a:p>
+            <a:pPr lvl="1"/>
+            <a:r>
+              <a:rPr lang="en-US" dirty="0"/>
+              <a:t>etc.</a:t>
+            </a:r>
+          </a:p>
+        </p:txBody>
+      </p:sp>
+    </p:spTree>
+    <p:extLst>
+      <p:ext uri="{BB962C8B-B14F-4D97-AF65-F5344CB8AC3E}">
+        <p14:creationId xmlns:p14="http://schemas.microsoft.com/office/powerpoint/2010/main" val="2133324402"/>
       </p:ext>
     </p:extLst>
   </p:cSld>
@@ -3575,10 +3738,9 @@
           <a:lstStyle/>
           <a:p>
             <a:r>
-              <a:rPr lang="en-US" dirty="0" smtClean="0"/>
+              <a:rPr lang="en-US" dirty="0"/>
               <a:t>Goals</a:t>
             </a:r>
-            <a:endParaRPr lang="en-US" dirty="0"/>
           </a:p>
         </p:txBody>
       </p:sp>
@@ -3604,24 +3766,20 @@
           <a:p>
             <a:r>
               <a:rPr lang="en-US" dirty="0"/>
-              <a:t>U</a:t>
-            </a:r>
-            <a:r>
-              <a:rPr lang="en-US" dirty="0" smtClean="0"/>
-              <a:t>nderstand how state is handled in a multi-component React application</a:t>
-            </a:r>
-          </a:p>
-          <a:p>
-            <a:r>
-              <a:rPr lang="en-US" dirty="0" smtClean="0"/>
+              <a:t>Understand how state is handled in a multi-component React application</a:t>
+            </a:r>
+          </a:p>
+          <a:p>
+            <a:r>
+              <a:rPr lang="en-US" dirty="0"/>
               <a:t>Learn how to write unit tests for </a:t>
             </a:r>
             <a:r>
-              <a:rPr lang="en-US" i="1" dirty="0" smtClean="0"/>
+              <a:rPr lang="en-US" i="1" dirty="0"/>
               <a:t>React</a:t>
             </a:r>
             <a:r>
-              <a:rPr lang="en-US" dirty="0" smtClean="0"/>
+              <a:rPr lang="en-US" dirty="0"/>
               <a:t> components</a:t>
             </a:r>
           </a:p>
@@ -3676,10 +3834,9 @@
           <a:lstStyle/>
           <a:p>
             <a:r>
-              <a:rPr lang="en-US" dirty="0" smtClean="0"/>
+              <a:rPr lang="en-US" dirty="0"/>
               <a:t>Parent-Children Tree Hierarchy</a:t>
             </a:r>
-            <a:endParaRPr lang="en-US" dirty="0"/>
           </a:p>
         </p:txBody>
       </p:sp>
@@ -3706,46 +3863,45 @@
           <a:lstStyle/>
           <a:p>
             <a:r>
-              <a:rPr lang="en-US" dirty="0" smtClean="0"/>
+              <a:rPr lang="en-US" dirty="0"/>
               <a:t>Each node can see its children</a:t>
             </a:r>
           </a:p>
           <a:p>
             <a:r>
-              <a:rPr lang="en-US" dirty="0" smtClean="0"/>
+              <a:rPr lang="en-US" dirty="0"/>
               <a:t>Node cannot directly see the parent</a:t>
             </a:r>
           </a:p>
           <a:p>
             <a:pPr lvl="1"/>
             <a:r>
-              <a:rPr lang="en-US" dirty="0" smtClean="0"/>
+              <a:rPr lang="en-US" dirty="0"/>
               <a:t>a component could be re-used in many different places</a:t>
             </a:r>
           </a:p>
           <a:p>
             <a:r>
-              <a:rPr lang="en-US" dirty="0" smtClean="0"/>
+              <a:rPr lang="en-US" dirty="0"/>
               <a:t>A component might need to modify the state of parent/ancestors, or of other siblings</a:t>
             </a:r>
           </a:p>
           <a:p>
             <a:pPr lvl="1"/>
             <a:r>
-              <a:rPr lang="en-US" dirty="0" err="1" smtClean="0"/>
+              <a:rPr lang="en-US" dirty="0" err="1"/>
               <a:t>eg</a:t>
             </a:r>
             <a:r>
-              <a:rPr lang="en-US" dirty="0" smtClean="0"/>
+              <a:rPr lang="en-US" dirty="0"/>
               <a:t>, B might need to interact with C, but B only sees its state, and the state of its children D and E</a:t>
             </a:r>
           </a:p>
           <a:p>
             <a:r>
-              <a:rPr lang="en-US" i="1" dirty="0" smtClean="0"/>
+              <a:rPr lang="en-US" i="1" dirty="0"/>
               <a:t>How to do that?</a:t>
             </a:r>
-            <a:endParaRPr lang="en-US" i="1" dirty="0"/>
           </a:p>
         </p:txBody>
       </p:sp>
@@ -3786,18 +3942,13 @@
           <a:p>
             <a:pPr algn="ctr"/>
             <a:r>
-              <a:rPr lang="en-US" sz="3200" dirty="0" smtClean="0">
+              <a:rPr lang="en-US" sz="3200" dirty="0">
                 <a:solidFill>
                   <a:schemeClr val="tx1"/>
                 </a:solidFill>
               </a:rPr>
               <a:t>A</a:t>
             </a:r>
-            <a:endParaRPr lang="en-US" sz="3200" dirty="0">
-              <a:solidFill>
-                <a:schemeClr val="tx1"/>
-              </a:solidFill>
-            </a:endParaRPr>
           </a:p>
         </p:txBody>
       </p:sp>
@@ -4179,10 +4330,9 @@
           <a:lstStyle/>
           <a:p>
             <a:r>
-              <a:rPr lang="en-US" dirty="0" smtClean="0"/>
+              <a:rPr lang="en-US" dirty="0"/>
               <a:t>Properties</a:t>
             </a:r>
-            <a:endParaRPr lang="en-US" dirty="0"/>
           </a:p>
         </p:txBody>
       </p:sp>
@@ -4209,137 +4359,136 @@
           <a:lstStyle/>
           <a:p>
             <a:r>
-              <a:rPr lang="en-US" dirty="0" smtClean="0"/>
+              <a:rPr lang="en-US" dirty="0"/>
               <a:t>When a parent creates a child X, it can pass to it some properties (</a:t>
             </a:r>
             <a:r>
-              <a:rPr lang="en-US" i="1" dirty="0" smtClean="0"/>
+              <a:rPr lang="en-US" i="1" dirty="0"/>
               <a:t>props</a:t>
             </a:r>
             <a:r>
-              <a:rPr lang="en-US" dirty="0" smtClean="0"/>
+              <a:rPr lang="en-US" dirty="0"/>
               <a:t>), similarly to HTML attributes</a:t>
             </a:r>
           </a:p>
           <a:p>
             <a:pPr lvl="1"/>
             <a:r>
-              <a:rPr lang="en-US" dirty="0" smtClean="0"/>
+              <a:rPr lang="en-US" dirty="0"/>
               <a:t>however, recall that JSX is transformed into JS, and such “</a:t>
             </a:r>
             <a:r>
-              <a:rPr lang="en-US" i="1" dirty="0" smtClean="0"/>
+              <a:rPr lang="en-US" i="1" dirty="0"/>
               <a:t>attributes</a:t>
             </a:r>
             <a:r>
-              <a:rPr lang="en-US" dirty="0" smtClean="0"/>
+              <a:rPr lang="en-US" dirty="0"/>
               <a:t>” are actually replaced by the appropriate calls to the </a:t>
             </a:r>
             <a:r>
-              <a:rPr lang="en-US" i="1" dirty="0" smtClean="0"/>
+              <a:rPr lang="en-US" i="1" dirty="0"/>
               <a:t>React</a:t>
             </a:r>
             <a:r>
-              <a:rPr lang="en-US" dirty="0" smtClean="0"/>
+              <a:rPr lang="en-US" dirty="0"/>
               <a:t> library</a:t>
             </a:r>
           </a:p>
           <a:p>
             <a:r>
-              <a:rPr lang="en-US" dirty="0" smtClean="0"/>
+              <a:rPr lang="en-US" dirty="0"/>
               <a:t>Ex., &lt;X </a:t>
             </a:r>
             <a:r>
-              <a:rPr lang="en-US" i="1" dirty="0" smtClean="0"/>
+              <a:rPr lang="en-US" i="1" dirty="0"/>
               <a:t>foo</a:t>
             </a:r>
             <a:r>
-              <a:rPr lang="en-US" dirty="0" smtClean="0"/>
+              <a:rPr lang="en-US" dirty="0"/>
               <a:t>=5 /&gt;</a:t>
             </a:r>
           </a:p>
           <a:p>
             <a:pPr lvl="1"/>
             <a:r>
-              <a:rPr lang="en-US" dirty="0" smtClean="0"/>
+              <a:rPr lang="en-US" dirty="0"/>
               <a:t>here the component X takes as input the prop </a:t>
             </a:r>
             <a:r>
-              <a:rPr lang="en-US" i="1" dirty="0" smtClean="0"/>
+              <a:rPr lang="en-US" i="1" dirty="0"/>
               <a:t>foo</a:t>
             </a:r>
             <a:r>
-              <a:rPr lang="en-US" dirty="0" smtClean="0"/>
+              <a:rPr lang="en-US" dirty="0"/>
               <a:t> with value 5</a:t>
             </a:r>
           </a:p>
           <a:p>
             <a:r>
-              <a:rPr lang="en-US" i="1" dirty="0" smtClean="0"/>
+              <a:rPr lang="en-US" i="1" dirty="0"/>
               <a:t>Props</a:t>
             </a:r>
             <a:r>
-              <a:rPr lang="en-US" dirty="0" smtClean="0"/>
+              <a:rPr lang="en-US" dirty="0"/>
               <a:t> should be considered as </a:t>
             </a:r>
             <a:r>
-              <a:rPr lang="en-US" b="1" dirty="0" smtClean="0"/>
+              <a:rPr lang="en-US" b="1" dirty="0"/>
               <a:t>immutable</a:t>
             </a:r>
             <a:r>
-              <a:rPr lang="en-US" dirty="0" smtClean="0"/>
+              <a:rPr lang="en-US" dirty="0"/>
               <a:t> state</a:t>
             </a:r>
           </a:p>
           <a:p>
             <a:pPr lvl="1"/>
             <a:r>
-              <a:rPr lang="en-US" dirty="0" smtClean="0"/>
+              <a:rPr lang="en-US" dirty="0"/>
               <a:t>you can read them, but not supposed to modify them in the child</a:t>
             </a:r>
           </a:p>
           <a:p>
             <a:pPr lvl="1"/>
             <a:r>
-              <a:rPr lang="en-US" dirty="0" smtClean="0"/>
+              <a:rPr lang="en-US" dirty="0"/>
               <a:t>can read/use </a:t>
             </a:r>
             <a:r>
-              <a:rPr lang="en-US" i="1" dirty="0" smtClean="0"/>
+              <a:rPr lang="en-US" i="1" dirty="0"/>
               <a:t>props</a:t>
             </a:r>
             <a:r>
-              <a:rPr lang="en-US" dirty="0" smtClean="0"/>
+              <a:rPr lang="en-US" dirty="0"/>
               <a:t> inside </a:t>
             </a:r>
             <a:r>
-              <a:rPr lang="en-US" i="1" dirty="0" smtClean="0"/>
+              <a:rPr lang="en-US" i="1" dirty="0"/>
               <a:t>render()</a:t>
             </a:r>
           </a:p>
           <a:p>
             <a:pPr lvl="1"/>
             <a:r>
-              <a:rPr lang="en-US" dirty="0" smtClean="0"/>
+              <a:rPr lang="en-US" dirty="0"/>
               <a:t>wrongly modifying a </a:t>
             </a:r>
             <a:r>
-              <a:rPr lang="en-US" i="1" dirty="0" smtClean="0"/>
+              <a:rPr lang="en-US" i="1" dirty="0"/>
               <a:t>prop</a:t>
             </a:r>
             <a:r>
-              <a:rPr lang="en-US" dirty="0" smtClean="0"/>
+              <a:rPr lang="en-US" dirty="0"/>
               <a:t> in the child does NOT trigger a new </a:t>
             </a:r>
             <a:r>
-              <a:rPr lang="en-US" i="1" dirty="0" smtClean="0"/>
+              <a:rPr lang="en-US" i="1" dirty="0"/>
               <a:t>render()</a:t>
             </a:r>
             <a:r>
-              <a:rPr lang="en-US" dirty="0" smtClean="0"/>
+              <a:rPr lang="en-US" dirty="0"/>
               <a:t> call</a:t>
             </a:r>
-            <a:endParaRPr lang="en-US" dirty="0"/>
           </a:p>
         </p:txBody>
       </p:sp>
@@ -4389,10 +4538,9 @@
           <a:lstStyle/>
           <a:p>
             <a:r>
-              <a:rPr lang="en-US" dirty="0" smtClean="0"/>
+              <a:rPr lang="en-US" dirty="0"/>
               <a:t>Callbacks</a:t>
             </a:r>
-            <a:endParaRPr lang="en-US" dirty="0"/>
           </a:p>
         </p:txBody>
       </p:sp>
@@ -4417,61 +4565,61 @@
           <a:lstStyle/>
           <a:p>
             <a:r>
-              <a:rPr lang="en-US" dirty="0" smtClean="0"/>
+              <a:rPr lang="en-US" dirty="0"/>
               <a:t>The content of a </a:t>
             </a:r>
             <a:r>
-              <a:rPr lang="en-US" i="1" dirty="0" smtClean="0"/>
+              <a:rPr lang="en-US" i="1" dirty="0"/>
               <a:t>prop</a:t>
             </a:r>
             <a:r>
-              <a:rPr lang="en-US" dirty="0" smtClean="0"/>
+              <a:rPr lang="en-US" dirty="0"/>
               <a:t> could be a function</a:t>
             </a:r>
           </a:p>
           <a:p>
             <a:r>
-              <a:rPr lang="en-US" dirty="0" smtClean="0"/>
+              <a:rPr lang="en-US" dirty="0"/>
               <a:t>Such function has the scope of the parent node</a:t>
             </a:r>
           </a:p>
           <a:p>
             <a:pPr lvl="1"/>
             <a:r>
-              <a:rPr lang="en-US" dirty="0" smtClean="0"/>
+              <a:rPr lang="en-US" dirty="0"/>
               <a:t>it can then call </a:t>
             </a:r>
             <a:r>
-              <a:rPr lang="en-US" i="1" dirty="0" err="1" smtClean="0"/>
+              <a:rPr lang="en-US" i="1" dirty="0" err="1"/>
               <a:t>setState</a:t>
             </a:r>
             <a:r>
-              <a:rPr lang="en-US" i="1" dirty="0" smtClean="0"/>
+              <a:rPr lang="en-US" i="1" dirty="0"/>
               <a:t>() </a:t>
             </a:r>
             <a:r>
-              <a:rPr lang="en-US" dirty="0" smtClean="0"/>
+              <a:rPr lang="en-US" dirty="0"/>
               <a:t>in the parent</a:t>
             </a:r>
           </a:p>
           <a:p>
             <a:pPr lvl="1"/>
             <a:r>
-              <a:rPr lang="en-US" dirty="0" smtClean="0"/>
+              <a:rPr lang="en-US" dirty="0"/>
               <a:t>can access the other siblings</a:t>
             </a:r>
           </a:p>
           <a:p>
             <a:r>
-              <a:rPr lang="en-US" dirty="0" smtClean="0"/>
+              <a:rPr lang="en-US" dirty="0"/>
               <a:t>If a child cannot directly interact with parent, parent can pass a callback as a </a:t>
             </a:r>
             <a:r>
-              <a:rPr lang="en-US" i="1" dirty="0" smtClean="0"/>
+              <a:rPr lang="en-US" i="1" dirty="0"/>
               <a:t>prop </a:t>
             </a:r>
             <a:r>
-              <a:rPr lang="en-US" dirty="0" smtClean="0"/>
+              <a:rPr lang="en-US" dirty="0"/>
               <a:t>to enable it</a:t>
             </a:r>
             <a:endParaRPr lang="en-US" i="1" dirty="0"/>
@@ -4524,10 +4672,9 @@
           <a:lstStyle/>
           <a:p>
             <a:r>
-              <a:rPr lang="en-US" dirty="0" smtClean="0"/>
+              <a:rPr lang="en-US" dirty="0"/>
               <a:t>State Lift Up</a:t>
             </a:r>
-            <a:endParaRPr lang="en-US" dirty="0"/>
           </a:p>
         </p:txBody>
       </p:sp>
@@ -4554,81 +4701,81 @@
           <a:lstStyle/>
           <a:p>
             <a:r>
-              <a:rPr lang="en-US" dirty="0" smtClean="0"/>
+              <a:rPr lang="en-US" dirty="0"/>
               <a:t>If two components depend on the same state, such state needs to be lifted up in a parent component</a:t>
             </a:r>
           </a:p>
           <a:p>
             <a:r>
-              <a:rPr lang="en-US" dirty="0" smtClean="0"/>
+              <a:rPr lang="en-US" dirty="0"/>
               <a:t>Parent will provide callbacks to manipulate such state</a:t>
             </a:r>
           </a:p>
           <a:p>
             <a:r>
-              <a:rPr lang="en-US" dirty="0" smtClean="0"/>
+              <a:rPr lang="en-US" dirty="0"/>
               <a:t>Recall: when state of a component is modified, all its children are re-rendered</a:t>
             </a:r>
           </a:p>
           <a:p>
             <a:r>
-              <a:rPr lang="en-US" dirty="0" smtClean="0"/>
+              <a:rPr lang="en-US" dirty="0"/>
               <a:t>Ex.: when </a:t>
             </a:r>
             <a:r>
-              <a:rPr lang="en-US" b="1" dirty="0" smtClean="0"/>
+              <a:rPr lang="en-US" b="1" dirty="0"/>
               <a:t>&lt;B&gt;</a:t>
             </a:r>
             <a:r>
-              <a:rPr lang="en-US" dirty="0" smtClean="0"/>
+              <a:rPr lang="en-US" dirty="0"/>
               <a:t> calls the function </a:t>
             </a:r>
             <a:r>
-              <a:rPr lang="en-US" i="1" dirty="0" smtClean="0"/>
+              <a:rPr lang="en-US" i="1" dirty="0"/>
               <a:t>x(), </a:t>
             </a:r>
             <a:r>
-              <a:rPr lang="en-US" dirty="0" smtClean="0"/>
+              <a:rPr lang="en-US" dirty="0"/>
               <a:t>this executes the function </a:t>
             </a:r>
             <a:r>
-              <a:rPr lang="en-US" i="1" dirty="0" err="1" smtClean="0"/>
+              <a:rPr lang="en-US" i="1" dirty="0" err="1"/>
               <a:t>A.callback</a:t>
             </a:r>
             <a:r>
-              <a:rPr lang="en-US" i="1" dirty="0" smtClean="0"/>
+              <a:rPr lang="en-US" i="1" dirty="0"/>
               <a:t>()</a:t>
             </a:r>
             <a:r>
-              <a:rPr lang="en-US" dirty="0" smtClean="0"/>
+              <a:rPr lang="en-US" dirty="0"/>
               <a:t>, which, if it changes the state of </a:t>
             </a:r>
             <a:r>
-              <a:rPr lang="en-US" b="1" dirty="0" smtClean="0"/>
+              <a:rPr lang="en-US" b="1" dirty="0"/>
               <a:t>&lt;A&gt;</a:t>
             </a:r>
             <a:r>
-              <a:rPr lang="en-US" dirty="0" smtClean="0"/>
+              <a:rPr lang="en-US" dirty="0"/>
               <a:t>, it will re-render </a:t>
             </a:r>
             <a:r>
-              <a:rPr lang="en-US" b="1" dirty="0" smtClean="0"/>
+              <a:rPr lang="en-US" b="1" dirty="0"/>
               <a:t>&lt;C&gt;</a:t>
             </a:r>
             <a:r>
-              <a:rPr lang="en-US" dirty="0" smtClean="0"/>
+              <a:rPr lang="en-US" dirty="0"/>
               <a:t> as well besides </a:t>
             </a:r>
             <a:r>
-              <a:rPr lang="en-US" b="1" dirty="0" smtClean="0"/>
+              <a:rPr lang="en-US" b="1" dirty="0"/>
               <a:t>&lt;A&gt;</a:t>
             </a:r>
             <a:r>
-              <a:rPr lang="en-US" dirty="0" smtClean="0"/>
+              <a:rPr lang="en-US" dirty="0"/>
               <a:t> and </a:t>
             </a:r>
             <a:r>
-              <a:rPr lang="en-US" b="1" dirty="0" smtClean="0"/>
+              <a:rPr lang="en-US" b="1" dirty="0"/>
               <a:t>&lt;B&gt;</a:t>
             </a:r>
             <a:endParaRPr lang="en-US" b="1" i="1" dirty="0"/>
@@ -4672,18 +4819,13 @@
           <a:p>
             <a:pPr algn="ctr"/>
             <a:r>
-              <a:rPr lang="en-US" sz="3200" dirty="0" smtClean="0">
+              <a:rPr lang="en-US" sz="3200" dirty="0">
                 <a:solidFill>
                   <a:schemeClr val="tx1"/>
                 </a:solidFill>
               </a:rPr>
               <a:t>A</a:t>
             </a:r>
-            <a:endParaRPr lang="en-US" sz="3200" dirty="0">
-              <a:solidFill>
-                <a:schemeClr val="tx1"/>
-              </a:solidFill>
-            </a:endParaRPr>
           </a:p>
         </p:txBody>
       </p:sp>
@@ -4876,36 +5018,27 @@
           <a:lstStyle/>
           <a:p>
             <a:r>
-              <a:rPr lang="en-US" sz="2800" b="1" dirty="0" smtClean="0"/>
+              <a:rPr lang="en-US" sz="2800" b="1" dirty="0"/>
               <a:t>&lt;A&gt;</a:t>
             </a:r>
           </a:p>
           <a:p>
             <a:r>
               <a:rPr lang="en-US" sz="2800" b="1" dirty="0"/>
-              <a:t> </a:t>
-            </a:r>
-            <a:r>
-              <a:rPr lang="en-US" sz="2800" b="1" dirty="0" smtClean="0"/>
-              <a:t>&lt;B x=callback /&gt;</a:t>
+              <a:t> &lt;B x=callback /&gt;</a:t>
             </a:r>
           </a:p>
           <a:p>
             <a:r>
               <a:rPr lang="en-US" sz="2800" b="1" dirty="0"/>
-              <a:t> </a:t>
-            </a:r>
-            <a:r>
-              <a:rPr lang="en-US" sz="2800" b="1" dirty="0" smtClean="0"/>
-              <a:t>&lt;C x=callback /&gt;</a:t>
-            </a:r>
-          </a:p>
-          <a:p>
-            <a:r>
-              <a:rPr lang="en-US" sz="2800" b="1" dirty="0" smtClean="0"/>
+              <a:t> &lt;C x=callback /&gt;</a:t>
+            </a:r>
+          </a:p>
+          <a:p>
+            <a:r>
+              <a:rPr lang="en-US" sz="2800" b="1" dirty="0"/>
               <a:t>&lt;/A&gt;</a:t>
             </a:r>
-            <a:endParaRPr lang="en-US" sz="2800" b="1" dirty="0"/>
           </a:p>
         </p:txBody>
       </p:sp>
@@ -4955,10 +5088,9 @@
           <a:lstStyle/>
           <a:p>
             <a:r>
-              <a:rPr lang="en-US" dirty="0" smtClean="0"/>
+              <a:rPr lang="en-US" dirty="0"/>
               <a:t>Complex State</a:t>
             </a:r>
-            <a:endParaRPr lang="en-US" dirty="0"/>
           </a:p>
         </p:txBody>
       </p:sp>
@@ -4985,19 +5117,15 @@
           <a:lstStyle/>
           <a:p>
             <a:r>
-              <a:rPr lang="en-US" dirty="0" smtClean="0"/>
+              <a:rPr lang="en-US" dirty="0"/>
               <a:t>This approach to handle shared state works well for many kinds of applications</a:t>
             </a:r>
           </a:p>
           <a:p>
             <a:pPr lvl="1"/>
             <a:r>
-              <a:rPr lang="en-US" dirty="0" smtClean="0"/>
-              <a:t>However, if you have a complex application, with a deep component tree and high relations between components, it might not scale </a:t>
-            </a:r>
-            <a:r>
-              <a:rPr lang="en-US" dirty="0" smtClean="0"/>
-              <a:t>well</a:t>
+              <a:rPr lang="en-US" dirty="0"/>
+              <a:t>However, if you have a complex application, with a deep component tree and high relations between components, it might not scale well</a:t>
             </a:r>
           </a:p>
           <a:p>
@@ -5017,51 +5145,49 @@
               <a:rPr lang="en-US" dirty="0"/>
               <a:t>”</a:t>
             </a:r>
-            <a:endParaRPr lang="en-US" dirty="0" smtClean="0"/>
-          </a:p>
-          <a:p>
-            <a:r>
-              <a:rPr lang="en-US" b="1" dirty="0" err="1" smtClean="0"/>
+          </a:p>
+          <a:p>
+            <a:r>
+              <a:rPr lang="en-US" b="1" dirty="0" err="1"/>
               <a:t>Redux</a:t>
             </a:r>
             <a:r>
-              <a:rPr lang="en-US" dirty="0" smtClean="0"/>
+              <a:rPr lang="en-US" dirty="0"/>
               <a:t>: a popular library to handle such scalability issue</a:t>
             </a:r>
           </a:p>
           <a:p>
             <a:pPr lvl="1"/>
             <a:r>
-              <a:rPr lang="en-US" dirty="0" smtClean="0"/>
+              <a:rPr lang="en-US" dirty="0"/>
               <a:t>one single source-of-truth for the state, and not spread around for each component</a:t>
             </a:r>
           </a:p>
           <a:p>
             <a:pPr lvl="1"/>
             <a:r>
-              <a:rPr lang="en-US" dirty="0" smtClean="0"/>
+              <a:rPr lang="en-US" dirty="0"/>
               <a:t>components need to be hooked into the </a:t>
             </a:r>
             <a:r>
-              <a:rPr lang="en-US" i="1" dirty="0" err="1" smtClean="0"/>
+              <a:rPr lang="en-US" i="1" dirty="0" err="1"/>
               <a:t>Redux</a:t>
             </a:r>
             <a:r>
-              <a:rPr lang="en-US" dirty="0" smtClean="0"/>
+              <a:rPr lang="en-US" dirty="0"/>
               <a:t> data-store, to be able to re-render automatically at each relevant state change</a:t>
             </a:r>
           </a:p>
           <a:p>
             <a:pPr lvl="1"/>
             <a:r>
-              <a:rPr lang="en-US" i="1" dirty="0" err="1" smtClean="0"/>
+              <a:rPr lang="en-US" i="1" dirty="0" err="1"/>
               <a:t>Redux</a:t>
             </a:r>
             <a:r>
-              <a:rPr lang="en-US" dirty="0" smtClean="0"/>
+              <a:rPr lang="en-US" dirty="0"/>
               <a:t> can be complex to use, and it is an overkill for what we need in this course. So will not use it, albeit you need to have an idea of what it is </a:t>
             </a:r>
-            <a:endParaRPr lang="en-US" dirty="0"/>
           </a:p>
         </p:txBody>
       </p:sp>
@@ -5111,10 +5237,9 @@
           <a:lstStyle/>
           <a:p>
             <a:r>
-              <a:rPr lang="en-US" dirty="0" smtClean="0"/>
+              <a:rPr lang="en-US" dirty="0"/>
               <a:t>Testing React Components</a:t>
             </a:r>
-            <a:endParaRPr lang="en-US" dirty="0"/>
           </a:p>
         </p:txBody>
       </p:sp>
@@ -5139,43 +5264,42 @@
           <a:lstStyle/>
           <a:p>
             <a:r>
-              <a:rPr lang="en-US" dirty="0" smtClean="0"/>
+              <a:rPr lang="en-US" dirty="0"/>
               <a:t>A React component has a </a:t>
             </a:r>
             <a:r>
-              <a:rPr lang="en-US" i="1" dirty="0" smtClean="0"/>
+              <a:rPr lang="en-US" i="1" dirty="0"/>
               <a:t>render() </a:t>
             </a:r>
             <a:r>
-              <a:rPr lang="en-US" dirty="0" smtClean="0"/>
+              <a:rPr lang="en-US" dirty="0"/>
               <a:t>method that generates HTML</a:t>
             </a:r>
           </a:p>
           <a:p>
             <a:r>
-              <a:rPr lang="en-US" dirty="0" smtClean="0"/>
+              <a:rPr lang="en-US" dirty="0"/>
               <a:t>The HTML tags can have event handlers that trigger state change</a:t>
             </a:r>
           </a:p>
           <a:p>
             <a:pPr lvl="1"/>
             <a:r>
-              <a:rPr lang="en-US" dirty="0" smtClean="0"/>
+              <a:rPr lang="en-US" dirty="0"/>
               <a:t>e.g., clicking on a button or hoovering with the mouse over a tag</a:t>
             </a:r>
           </a:p>
           <a:p>
             <a:r>
-              <a:rPr lang="en-US" dirty="0" smtClean="0"/>
+              <a:rPr lang="en-US" dirty="0"/>
               <a:t>When state changes due to a triggered event, the HTML might change</a:t>
             </a:r>
           </a:p>
           <a:p>
             <a:r>
-              <a:rPr lang="en-US" i="1" dirty="0" smtClean="0"/>
+              <a:rPr lang="en-US" i="1" dirty="0"/>
               <a:t>How to unit test such behaviors? </a:t>
             </a:r>
-            <a:endParaRPr lang="en-US" i="1" dirty="0"/>
           </a:p>
         </p:txBody>
       </p:sp>
@@ -5225,10 +5349,9 @@
           <a:lstStyle/>
           <a:p>
             <a:r>
-              <a:rPr lang="en-US" dirty="0" smtClean="0"/>
+              <a:rPr lang="en-US" dirty="0"/>
               <a:t>Simulate a Browser</a:t>
             </a:r>
-            <a:endParaRPr lang="en-US" dirty="0"/>
           </a:p>
         </p:txBody>
       </p:sp>
@@ -5255,82 +5378,77 @@
           <a:lstStyle/>
           <a:p>
             <a:r>
-              <a:rPr lang="en-US" dirty="0" smtClean="0"/>
+              <a:rPr lang="en-US" dirty="0"/>
               <a:t>For </a:t>
             </a:r>
             <a:r>
-              <a:rPr lang="en-US" b="1" dirty="0" smtClean="0"/>
+              <a:rPr lang="en-US" b="1" dirty="0"/>
               <a:t>unit</a:t>
             </a:r>
             <a:r>
-              <a:rPr lang="en-US" dirty="0" smtClean="0"/>
+              <a:rPr lang="en-US" dirty="0"/>
               <a:t> testing (and not </a:t>
             </a:r>
             <a:r>
-              <a:rPr lang="en-US" b="1" dirty="0" smtClean="0"/>
+              <a:rPr lang="en-US" b="1" dirty="0"/>
               <a:t>system</a:t>
             </a:r>
             <a:r>
-              <a:rPr lang="en-US" dirty="0" smtClean="0"/>
+              <a:rPr lang="en-US" dirty="0"/>
               <a:t> testing), using actual browser is an overkill</a:t>
             </a:r>
           </a:p>
           <a:p>
             <a:r>
-              <a:rPr lang="en-US" dirty="0" smtClean="0"/>
+              <a:rPr lang="en-US" dirty="0"/>
               <a:t>We need to run a fake, headless browser directly in JS, inside </a:t>
             </a:r>
             <a:r>
-              <a:rPr lang="en-US" i="1" dirty="0" err="1" smtClean="0"/>
+              <a:rPr lang="en-US" i="1" dirty="0" err="1"/>
               <a:t>NodeJS</a:t>
             </a:r>
             <a:r>
-              <a:rPr lang="en-US" dirty="0" smtClean="0"/>
+              <a:rPr lang="en-US" dirty="0"/>
               <a:t> runtime</a:t>
             </a:r>
           </a:p>
           <a:p>
             <a:r>
-              <a:rPr lang="en-US" dirty="0" smtClean="0"/>
-              <a:t>This can be done </a:t>
-            </a:r>
-            <a:r>
-              <a:rPr lang="en-US" dirty="0"/>
-              <a:t>with libraries like </a:t>
-            </a:r>
-            <a:r>
-              <a:rPr lang="en-US" i="1" dirty="0" smtClean="0"/>
+              <a:rPr lang="en-US" dirty="0"/>
+              <a:t>This can be done with libraries like </a:t>
+            </a:r>
+            <a:r>
+              <a:rPr lang="en-US" i="1" dirty="0"/>
               <a:t>Enzyme</a:t>
             </a:r>
             <a:r>
-              <a:rPr lang="en-US" dirty="0" smtClean="0"/>
+              <a:rPr lang="en-US" dirty="0"/>
               <a:t> and </a:t>
             </a:r>
             <a:r>
-              <a:rPr lang="en-US" i="1" dirty="0" smtClean="0"/>
+              <a:rPr lang="en-US" i="1" dirty="0"/>
               <a:t>JSDOM</a:t>
             </a:r>
           </a:p>
           <a:p>
             <a:r>
-              <a:rPr lang="en-US" dirty="0" smtClean="0"/>
+              <a:rPr lang="en-US" dirty="0"/>
               <a:t>We will use a base HTML page in which we will dynamically </a:t>
             </a:r>
             <a:r>
-              <a:rPr lang="en-US" i="1" dirty="0" smtClean="0"/>
+              <a:rPr lang="en-US" i="1" dirty="0"/>
               <a:t>mount </a:t>
             </a:r>
             <a:r>
-              <a:rPr lang="en-US" dirty="0" smtClean="0"/>
+              <a:rPr lang="en-US" dirty="0"/>
               <a:t>the component we want to test </a:t>
             </a:r>
           </a:p>
           <a:p>
             <a:r>
-              <a:rPr lang="en-US" dirty="0" smtClean="0"/>
+              <a:rPr lang="en-US" dirty="0"/>
               <a:t>We will simulate clicks and other events, and see what HTML strings are generated in reaction to those events</a:t>
             </a:r>
-            <a:endParaRPr lang="en-US" dirty="0"/>
           </a:p>
         </p:txBody>
       </p:sp>

</xml_diff>